<commit_message>
tp-16 fix: add slide numbering
</commit_message>
<xml_diff>
--- a/documentation/Презентация_Технического_Задания.pptx
+++ b/documentation/Презентация_Технического_Задания.pptx
@@ -209,7 +209,7 @@
           <a:p>
             <a:fld id="{615D3476-A1CB-4D20-928F-9A1668B4B2D2}" type="datetimeFigureOut">
               <a:rPr lang="ru-RU" smtClean="0"/>
-              <a:t>13.03.2024</a:t>
+              <a:t>21.03.2024</a:t>
             </a:fld>
             <a:endParaRPr lang="ru-RU"/>
           </a:p>
@@ -705,9 +705,9 @@
           <a:bodyPr/>
           <a:lstStyle/>
           <a:p>
-            <a:fld id="{202F1E60-8E83-4543-9EAB-87A6B0719471}" type="datetimeFigureOut">
+            <a:fld id="{98C203B8-E11A-47A2-9AB5-05374BC03F4A}" type="datetime1">
               <a:rPr lang="ru-RU" smtClean="0"/>
-              <a:t>13.03.2024</a:t>
+              <a:t>21.03.2024</a:t>
             </a:fld>
             <a:endParaRPr lang="ru-RU"/>
           </a:p>
@@ -903,9 +903,9 @@
           <a:bodyPr/>
           <a:lstStyle/>
           <a:p>
-            <a:fld id="{202F1E60-8E83-4543-9EAB-87A6B0719471}" type="datetimeFigureOut">
+            <a:fld id="{F8163BD0-E318-4A82-8062-ADB91AC13A07}" type="datetime1">
               <a:rPr lang="ru-RU" smtClean="0"/>
-              <a:t>13.03.2024</a:t>
+              <a:t>21.03.2024</a:t>
             </a:fld>
             <a:endParaRPr lang="ru-RU"/>
           </a:p>
@@ -1111,9 +1111,9 @@
           <a:bodyPr/>
           <a:lstStyle/>
           <a:p>
-            <a:fld id="{202F1E60-8E83-4543-9EAB-87A6B0719471}" type="datetimeFigureOut">
+            <a:fld id="{414B35C4-C273-4DFC-9300-C820216D3064}" type="datetime1">
               <a:rPr lang="ru-RU" smtClean="0"/>
-              <a:t>13.03.2024</a:t>
+              <a:t>21.03.2024</a:t>
             </a:fld>
             <a:endParaRPr lang="ru-RU"/>
           </a:p>
@@ -1309,9 +1309,9 @@
           <a:bodyPr/>
           <a:lstStyle/>
           <a:p>
-            <a:fld id="{202F1E60-8E83-4543-9EAB-87A6B0719471}" type="datetimeFigureOut">
+            <a:fld id="{ABE436D4-23F2-4B5F-AEE8-FC0F4FB4B6DA}" type="datetime1">
               <a:rPr lang="ru-RU" smtClean="0"/>
-              <a:t>13.03.2024</a:t>
+              <a:t>21.03.2024</a:t>
             </a:fld>
             <a:endParaRPr lang="ru-RU"/>
           </a:p>
@@ -1584,9 +1584,9 @@
           <a:bodyPr/>
           <a:lstStyle/>
           <a:p>
-            <a:fld id="{202F1E60-8E83-4543-9EAB-87A6B0719471}" type="datetimeFigureOut">
+            <a:fld id="{282A8B27-5EA8-49E1-AADB-BAB2D0CA2BDA}" type="datetime1">
               <a:rPr lang="ru-RU" smtClean="0"/>
-              <a:t>13.03.2024</a:t>
+              <a:t>21.03.2024</a:t>
             </a:fld>
             <a:endParaRPr lang="ru-RU"/>
           </a:p>
@@ -1849,9 +1849,9 @@
           <a:bodyPr/>
           <a:lstStyle/>
           <a:p>
-            <a:fld id="{202F1E60-8E83-4543-9EAB-87A6B0719471}" type="datetimeFigureOut">
+            <a:fld id="{4CB0D79E-4BD7-46BC-8887-F9E7C5EB281F}" type="datetime1">
               <a:rPr lang="ru-RU" smtClean="0"/>
-              <a:t>13.03.2024</a:t>
+              <a:t>21.03.2024</a:t>
             </a:fld>
             <a:endParaRPr lang="ru-RU"/>
           </a:p>
@@ -2261,9 +2261,9 @@
           <a:bodyPr/>
           <a:lstStyle/>
           <a:p>
-            <a:fld id="{202F1E60-8E83-4543-9EAB-87A6B0719471}" type="datetimeFigureOut">
+            <a:fld id="{DEC35717-F77C-4419-A371-70DE2A8E4E56}" type="datetime1">
               <a:rPr lang="ru-RU" smtClean="0"/>
-              <a:t>13.03.2024</a:t>
+              <a:t>21.03.2024</a:t>
             </a:fld>
             <a:endParaRPr lang="ru-RU"/>
           </a:p>
@@ -2402,9 +2402,9 @@
           <a:bodyPr/>
           <a:lstStyle/>
           <a:p>
-            <a:fld id="{202F1E60-8E83-4543-9EAB-87A6B0719471}" type="datetimeFigureOut">
+            <a:fld id="{88FEB8CD-1069-4902-80A9-F7B101631CDC}" type="datetime1">
               <a:rPr lang="ru-RU" smtClean="0"/>
-              <a:t>13.03.2024</a:t>
+              <a:t>21.03.2024</a:t>
             </a:fld>
             <a:endParaRPr lang="ru-RU"/>
           </a:p>
@@ -2515,9 +2515,9 @@
           <a:bodyPr/>
           <a:lstStyle/>
           <a:p>
-            <a:fld id="{202F1E60-8E83-4543-9EAB-87A6B0719471}" type="datetimeFigureOut">
+            <a:fld id="{FC2EB57B-406A-4D90-B923-19E1C270C262}" type="datetime1">
               <a:rPr lang="ru-RU" smtClean="0"/>
-              <a:t>13.03.2024</a:t>
+              <a:t>21.03.2024</a:t>
             </a:fld>
             <a:endParaRPr lang="ru-RU"/>
           </a:p>
@@ -2826,9 +2826,9 @@
           <a:bodyPr/>
           <a:lstStyle/>
           <a:p>
-            <a:fld id="{202F1E60-8E83-4543-9EAB-87A6B0719471}" type="datetimeFigureOut">
+            <a:fld id="{14DC290D-AAB6-4F99-A4D6-5554CA9B68DF}" type="datetime1">
               <a:rPr lang="ru-RU" smtClean="0"/>
-              <a:t>13.03.2024</a:t>
+              <a:t>21.03.2024</a:t>
             </a:fld>
             <a:endParaRPr lang="ru-RU"/>
           </a:p>
@@ -3114,9 +3114,9 @@
           <a:bodyPr/>
           <a:lstStyle/>
           <a:p>
-            <a:fld id="{202F1E60-8E83-4543-9EAB-87A6B0719471}" type="datetimeFigureOut">
+            <a:fld id="{1E45CE65-93E8-4ABA-8810-698FF8F6F0F0}" type="datetime1">
               <a:rPr lang="ru-RU" smtClean="0"/>
-              <a:t>13.03.2024</a:t>
+              <a:t>21.03.2024</a:t>
             </a:fld>
             <a:endParaRPr lang="ru-RU"/>
           </a:p>
@@ -3355,9 +3355,9 @@
             </a:lvl1pPr>
           </a:lstStyle>
           <a:p>
-            <a:fld id="{202F1E60-8E83-4543-9EAB-87A6B0719471}" type="datetimeFigureOut">
+            <a:fld id="{0F48FE7F-ACC3-4CB9-8917-EA9C0B331C44}" type="datetime1">
               <a:rPr lang="ru-RU" smtClean="0"/>
-              <a:t>13.03.2024</a:t>
+              <a:t>21.03.2024</a:t>
             </a:fld>
             <a:endParaRPr lang="ru-RU"/>
           </a:p>
@@ -3474,6 +3474,7 @@
     <p:sldLayoutId id="2147483658" r:id="rId10"/>
     <p:sldLayoutId id="2147483659" r:id="rId11"/>
   </p:sldLayoutIdLst>
+  <p:hf hdr="0" dt="0"/>
   <p:txStyles>
     <p:titleStyle>
       <a:lvl1pPr algn="l" defTabSz="914400" rtl="0" eaLnBrk="1" latinLnBrk="0" hangingPunct="1">
@@ -4050,6 +4051,35 @@
           </a:p>
         </p:txBody>
       </p:sp>
+      <p:sp>
+        <p:nvSpPr>
+          <p:cNvPr id="6" name="Номер слайда 5"/>
+          <p:cNvSpPr>
+            <a:spLocks noGrp="1"/>
+          </p:cNvSpPr>
+          <p:nvPr>
+            <p:ph type="sldNum" sz="quarter" idx="12"/>
+          </p:nvPr>
+        </p:nvSpPr>
+        <p:spPr/>
+        <p:txBody>
+          <a:bodyPr/>
+          <a:lstStyle/>
+          <a:p>
+            <a:fld id="{877809C6-F2D1-4BB8-B240-DFC65F9EFAF3}" type="slidenum">
+              <a:rPr lang="ru-RU" sz="2000" smtClean="0">
+                <a:latin typeface="Arial" panose="020B0604020202020204" pitchFamily="34" charset="0"/>
+                <a:cs typeface="Arial" panose="020B0604020202020204" pitchFamily="34" charset="0"/>
+              </a:rPr>
+              <a:t>10</a:t>
+            </a:fld>
+            <a:endParaRPr lang="ru-RU" sz="2000" dirty="0">
+              <a:latin typeface="Arial" panose="020B0604020202020204" pitchFamily="34" charset="0"/>
+              <a:cs typeface="Arial" panose="020B0604020202020204" pitchFamily="34" charset="0"/>
+            </a:endParaRPr>
+          </a:p>
+        </p:txBody>
+      </p:sp>
     </p:spTree>
     <p:extLst>
       <p:ext uri="{BB962C8B-B14F-4D97-AF65-F5344CB8AC3E}">
@@ -4187,6 +4217,35 @@
           </a:p>
         </p:txBody>
       </p:sp>
+      <p:sp>
+        <p:nvSpPr>
+          <p:cNvPr id="6" name="Номер слайда 5"/>
+          <p:cNvSpPr>
+            <a:spLocks noGrp="1"/>
+          </p:cNvSpPr>
+          <p:nvPr>
+            <p:ph type="sldNum" sz="quarter" idx="12"/>
+          </p:nvPr>
+        </p:nvSpPr>
+        <p:spPr/>
+        <p:txBody>
+          <a:bodyPr/>
+          <a:lstStyle/>
+          <a:p>
+            <a:fld id="{877809C6-F2D1-4BB8-B240-DFC65F9EFAF3}" type="slidenum">
+              <a:rPr lang="ru-RU" sz="2000" smtClean="0">
+                <a:latin typeface="Arial" panose="020B0604020202020204" pitchFamily="34" charset="0"/>
+                <a:cs typeface="Arial" panose="020B0604020202020204" pitchFamily="34" charset="0"/>
+              </a:rPr>
+              <a:t>11</a:t>
+            </a:fld>
+            <a:endParaRPr lang="ru-RU" dirty="0">
+              <a:latin typeface="Arial" panose="020B0604020202020204" pitchFamily="34" charset="0"/>
+              <a:cs typeface="Arial" panose="020B0604020202020204" pitchFamily="34" charset="0"/>
+            </a:endParaRPr>
+          </a:p>
+        </p:txBody>
+      </p:sp>
     </p:spTree>
     <p:extLst>
       <p:ext uri="{BB962C8B-B14F-4D97-AF65-F5344CB8AC3E}">
@@ -4376,6 +4435,35 @@
           </a:p>
         </p:txBody>
       </p:sp>
+      <p:sp>
+        <p:nvSpPr>
+          <p:cNvPr id="6" name="Номер слайда 5"/>
+          <p:cNvSpPr>
+            <a:spLocks noGrp="1"/>
+          </p:cNvSpPr>
+          <p:nvPr>
+            <p:ph type="sldNum" sz="quarter" idx="12"/>
+          </p:nvPr>
+        </p:nvSpPr>
+        <p:spPr/>
+        <p:txBody>
+          <a:bodyPr/>
+          <a:lstStyle/>
+          <a:p>
+            <a:fld id="{877809C6-F2D1-4BB8-B240-DFC65F9EFAF3}" type="slidenum">
+              <a:rPr lang="ru-RU" sz="2000" smtClean="0">
+                <a:latin typeface="Arial" panose="020B0604020202020204" pitchFamily="34" charset="0"/>
+                <a:cs typeface="Arial" panose="020B0604020202020204" pitchFamily="34" charset="0"/>
+              </a:rPr>
+              <a:t>12</a:t>
+            </a:fld>
+            <a:endParaRPr lang="ru-RU" sz="2000" dirty="0">
+              <a:latin typeface="Arial" panose="020B0604020202020204" pitchFamily="34" charset="0"/>
+              <a:cs typeface="Arial" panose="020B0604020202020204" pitchFamily="34" charset="0"/>
+            </a:endParaRPr>
+          </a:p>
+        </p:txBody>
+      </p:sp>
     </p:spTree>
     <p:extLst>
       <p:ext uri="{BB962C8B-B14F-4D97-AF65-F5344CB8AC3E}">
@@ -4482,6 +4570,35 @@
           </a:p>
         </p:txBody>
       </p:sp>
+      <p:sp>
+        <p:nvSpPr>
+          <p:cNvPr id="6" name="Номер слайда 5"/>
+          <p:cNvSpPr>
+            <a:spLocks noGrp="1"/>
+          </p:cNvSpPr>
+          <p:nvPr>
+            <p:ph type="sldNum" sz="quarter" idx="12"/>
+          </p:nvPr>
+        </p:nvSpPr>
+        <p:spPr/>
+        <p:txBody>
+          <a:bodyPr/>
+          <a:lstStyle/>
+          <a:p>
+            <a:fld id="{877809C6-F2D1-4BB8-B240-DFC65F9EFAF3}" type="slidenum">
+              <a:rPr lang="ru-RU" sz="2000" smtClean="0">
+                <a:latin typeface="Arial" panose="020B0604020202020204" pitchFamily="34" charset="0"/>
+                <a:cs typeface="Arial" panose="020B0604020202020204" pitchFamily="34" charset="0"/>
+              </a:rPr>
+              <a:t>13</a:t>
+            </a:fld>
+            <a:endParaRPr lang="ru-RU" dirty="0">
+              <a:latin typeface="Arial" panose="020B0604020202020204" pitchFamily="34" charset="0"/>
+              <a:cs typeface="Arial" panose="020B0604020202020204" pitchFamily="34" charset="0"/>
+            </a:endParaRPr>
+          </a:p>
+        </p:txBody>
+      </p:sp>
     </p:spTree>
     <p:extLst>
       <p:ext uri="{BB962C8B-B14F-4D97-AF65-F5344CB8AC3E}">
@@ -4592,6 +4709,35 @@
           </a:p>
         </p:txBody>
       </p:sp>
+      <p:sp>
+        <p:nvSpPr>
+          <p:cNvPr id="6" name="Номер слайда 5"/>
+          <p:cNvSpPr>
+            <a:spLocks noGrp="1"/>
+          </p:cNvSpPr>
+          <p:nvPr>
+            <p:ph type="sldNum" sz="quarter" idx="12"/>
+          </p:nvPr>
+        </p:nvSpPr>
+        <p:spPr/>
+        <p:txBody>
+          <a:bodyPr/>
+          <a:lstStyle/>
+          <a:p>
+            <a:fld id="{877809C6-F2D1-4BB8-B240-DFC65F9EFAF3}" type="slidenum">
+              <a:rPr lang="ru-RU" sz="2000" smtClean="0">
+                <a:latin typeface="Arial" panose="020B0604020202020204" pitchFamily="34" charset="0"/>
+                <a:cs typeface="Arial" panose="020B0604020202020204" pitchFamily="34" charset="0"/>
+              </a:rPr>
+              <a:t>2</a:t>
+            </a:fld>
+            <a:endParaRPr lang="ru-RU" sz="2000" dirty="0">
+              <a:latin typeface="Arial" panose="020B0604020202020204" pitchFamily="34" charset="0"/>
+              <a:cs typeface="Arial" panose="020B0604020202020204" pitchFamily="34" charset="0"/>
+            </a:endParaRPr>
+          </a:p>
+        </p:txBody>
+      </p:sp>
     </p:spTree>
     <p:extLst>
       <p:ext uri="{BB962C8B-B14F-4D97-AF65-F5344CB8AC3E}">
@@ -4691,6 +4837,35 @@
           </a:p>
         </p:txBody>
       </p:sp>
+      <p:sp>
+        <p:nvSpPr>
+          <p:cNvPr id="6" name="Номер слайда 5"/>
+          <p:cNvSpPr>
+            <a:spLocks noGrp="1"/>
+          </p:cNvSpPr>
+          <p:nvPr>
+            <p:ph type="sldNum" sz="quarter" idx="12"/>
+          </p:nvPr>
+        </p:nvSpPr>
+        <p:spPr/>
+        <p:txBody>
+          <a:bodyPr/>
+          <a:lstStyle/>
+          <a:p>
+            <a:fld id="{877809C6-F2D1-4BB8-B240-DFC65F9EFAF3}" type="slidenum">
+              <a:rPr lang="ru-RU" sz="2000" smtClean="0">
+                <a:latin typeface="Arial" panose="020B0604020202020204" pitchFamily="34" charset="0"/>
+                <a:cs typeface="Arial" panose="020B0604020202020204" pitchFamily="34" charset="0"/>
+              </a:rPr>
+              <a:t>3</a:t>
+            </a:fld>
+            <a:endParaRPr lang="ru-RU" sz="2000" dirty="0">
+              <a:latin typeface="Arial" panose="020B0604020202020204" pitchFamily="34" charset="0"/>
+              <a:cs typeface="Arial" panose="020B0604020202020204" pitchFamily="34" charset="0"/>
+            </a:endParaRPr>
+          </a:p>
+        </p:txBody>
+      </p:sp>
     </p:spTree>
     <p:extLst>
       <p:ext uri="{BB962C8B-B14F-4D97-AF65-F5344CB8AC3E}">
@@ -4797,6 +4972,35 @@
           </a:p>
         </p:txBody>
       </p:sp>
+      <p:sp>
+        <p:nvSpPr>
+          <p:cNvPr id="6" name="Номер слайда 5"/>
+          <p:cNvSpPr>
+            <a:spLocks noGrp="1"/>
+          </p:cNvSpPr>
+          <p:nvPr>
+            <p:ph type="sldNum" sz="quarter" idx="12"/>
+          </p:nvPr>
+        </p:nvSpPr>
+        <p:spPr/>
+        <p:txBody>
+          <a:bodyPr/>
+          <a:lstStyle/>
+          <a:p>
+            <a:fld id="{877809C6-F2D1-4BB8-B240-DFC65F9EFAF3}" type="slidenum">
+              <a:rPr lang="ru-RU" sz="2000" smtClean="0">
+                <a:latin typeface="Arial" panose="020B0604020202020204" pitchFamily="34" charset="0"/>
+                <a:cs typeface="Arial" panose="020B0604020202020204" pitchFamily="34" charset="0"/>
+              </a:rPr>
+              <a:t>4</a:t>
+            </a:fld>
+            <a:endParaRPr lang="ru-RU" sz="2000" dirty="0">
+              <a:latin typeface="Arial" panose="020B0604020202020204" pitchFamily="34" charset="0"/>
+              <a:cs typeface="Arial" panose="020B0604020202020204" pitchFamily="34" charset="0"/>
+            </a:endParaRPr>
+          </a:p>
+        </p:txBody>
+      </p:sp>
     </p:spTree>
     <p:extLst>
       <p:ext uri="{BB962C8B-B14F-4D97-AF65-F5344CB8AC3E}">
@@ -4979,6 +5183,35 @@
           </a:p>
         </p:txBody>
       </p:sp>
+      <p:sp>
+        <p:nvSpPr>
+          <p:cNvPr id="6" name="Номер слайда 5"/>
+          <p:cNvSpPr>
+            <a:spLocks noGrp="1"/>
+          </p:cNvSpPr>
+          <p:nvPr>
+            <p:ph type="sldNum" sz="quarter" idx="12"/>
+          </p:nvPr>
+        </p:nvSpPr>
+        <p:spPr/>
+        <p:txBody>
+          <a:bodyPr/>
+          <a:lstStyle/>
+          <a:p>
+            <a:fld id="{877809C6-F2D1-4BB8-B240-DFC65F9EFAF3}" type="slidenum">
+              <a:rPr lang="ru-RU" sz="2000" smtClean="0">
+                <a:latin typeface="Arial" panose="020B0604020202020204" pitchFamily="34" charset="0"/>
+                <a:cs typeface="Arial" panose="020B0604020202020204" pitchFamily="34" charset="0"/>
+              </a:rPr>
+              <a:t>5</a:t>
+            </a:fld>
+            <a:endParaRPr lang="ru-RU" sz="2000" dirty="0">
+              <a:latin typeface="Arial" panose="020B0604020202020204" pitchFamily="34" charset="0"/>
+              <a:cs typeface="Arial" panose="020B0604020202020204" pitchFamily="34" charset="0"/>
+            </a:endParaRPr>
+          </a:p>
+        </p:txBody>
+      </p:sp>
     </p:spTree>
     <p:extLst>
       <p:ext uri="{BB962C8B-B14F-4D97-AF65-F5344CB8AC3E}">
@@ -5099,6 +5332,29 @@
           </a:p>
         </p:txBody>
       </p:sp>
+      <p:sp>
+        <p:nvSpPr>
+          <p:cNvPr id="6" name="Номер слайда 5"/>
+          <p:cNvSpPr>
+            <a:spLocks noGrp="1"/>
+          </p:cNvSpPr>
+          <p:nvPr>
+            <p:ph type="sldNum" sz="quarter" idx="12"/>
+          </p:nvPr>
+        </p:nvSpPr>
+        <p:spPr/>
+        <p:txBody>
+          <a:bodyPr/>
+          <a:lstStyle/>
+          <a:p>
+            <a:fld id="{877809C6-F2D1-4BB8-B240-DFC65F9EFAF3}" type="slidenum">
+              <a:rPr lang="ru-RU" sz="2000" smtClean="0"/>
+              <a:t>6</a:t>
+            </a:fld>
+            <a:endParaRPr lang="ru-RU" sz="2000" dirty="0"/>
+          </a:p>
+        </p:txBody>
+      </p:sp>
     </p:spTree>
     <p:extLst>
       <p:ext uri="{BB962C8B-B14F-4D97-AF65-F5344CB8AC3E}">
@@ -5300,8 +5556,8 @@
         </p:blipFill>
         <p:spPr>
           <a:xfrm>
-            <a:off x="169153" y="963915"/>
-            <a:ext cx="4884447" cy="5234970"/>
+            <a:off x="316528" y="963915"/>
+            <a:ext cx="4702530" cy="5040000"/>
           </a:xfrm>
           <a:prstGeom prst="rect">
             <a:avLst/>
@@ -5336,14 +5592,43 @@
         </p:blipFill>
         <p:spPr>
           <a:xfrm>
-            <a:off x="5223113" y="963915"/>
-            <a:ext cx="6790503" cy="5234970"/>
+            <a:off x="5341800" y="963915"/>
+            <a:ext cx="6537599" cy="5040000"/>
           </a:xfrm>
           <a:prstGeom prst="rect">
             <a:avLst/>
           </a:prstGeom>
         </p:spPr>
       </p:pic>
+      <p:sp>
+        <p:nvSpPr>
+          <p:cNvPr id="10" name="Номер слайда 9"/>
+          <p:cNvSpPr>
+            <a:spLocks noGrp="1"/>
+          </p:cNvSpPr>
+          <p:nvPr>
+            <p:ph type="sldNum" sz="quarter" idx="12"/>
+          </p:nvPr>
+        </p:nvSpPr>
+        <p:spPr/>
+        <p:txBody>
+          <a:bodyPr/>
+          <a:lstStyle/>
+          <a:p>
+            <a:fld id="{877809C6-F2D1-4BB8-B240-DFC65F9EFAF3}" type="slidenum">
+              <a:rPr lang="ru-RU" sz="2000" smtClean="0">
+                <a:latin typeface="Arial" panose="020B0604020202020204" pitchFamily="34" charset="0"/>
+                <a:cs typeface="Arial" panose="020B0604020202020204" pitchFamily="34" charset="0"/>
+              </a:rPr>
+              <a:t>7</a:t>
+            </a:fld>
+            <a:endParaRPr lang="ru-RU" sz="2000" dirty="0">
+              <a:latin typeface="Arial" panose="020B0604020202020204" pitchFamily="34" charset="0"/>
+              <a:cs typeface="Arial" panose="020B0604020202020204" pitchFamily="34" charset="0"/>
+            </a:endParaRPr>
+          </a:p>
+        </p:txBody>
+      </p:sp>
     </p:spTree>
     <p:extLst>
       <p:ext uri="{BB962C8B-B14F-4D97-AF65-F5344CB8AC3E}">
@@ -5545,8 +5830,8 @@
         </p:blipFill>
         <p:spPr>
           <a:xfrm>
-            <a:off x="8636136" y="867467"/>
-            <a:ext cx="3146735" cy="5689814"/>
+            <a:off x="8170432" y="867467"/>
+            <a:ext cx="2787352" cy="5040000"/>
           </a:xfrm>
           <a:prstGeom prst="rect">
             <a:avLst/>
@@ -5581,14 +5866,43 @@
         </p:blipFill>
         <p:spPr>
           <a:xfrm>
-            <a:off x="409129" y="867467"/>
-            <a:ext cx="7435458" cy="5689814"/>
+            <a:off x="391384" y="867467"/>
+            <a:ext cx="6586277" cy="5040000"/>
           </a:xfrm>
           <a:prstGeom prst="rect">
             <a:avLst/>
           </a:prstGeom>
         </p:spPr>
       </p:pic>
+      <p:sp>
+        <p:nvSpPr>
+          <p:cNvPr id="10" name="Номер слайда 9"/>
+          <p:cNvSpPr>
+            <a:spLocks noGrp="1"/>
+          </p:cNvSpPr>
+          <p:nvPr>
+            <p:ph type="sldNum" sz="quarter" idx="12"/>
+          </p:nvPr>
+        </p:nvSpPr>
+        <p:spPr/>
+        <p:txBody>
+          <a:bodyPr/>
+          <a:lstStyle/>
+          <a:p>
+            <a:fld id="{877809C6-F2D1-4BB8-B240-DFC65F9EFAF3}" type="slidenum">
+              <a:rPr lang="ru-RU" sz="2000" smtClean="0">
+                <a:latin typeface="Arial" panose="020B0604020202020204" pitchFamily="34" charset="0"/>
+                <a:cs typeface="Arial" panose="020B0604020202020204" pitchFamily="34" charset="0"/>
+              </a:rPr>
+              <a:t>8</a:t>
+            </a:fld>
+            <a:endParaRPr lang="ru-RU" sz="2000" dirty="0">
+              <a:latin typeface="Arial" panose="020B0604020202020204" pitchFamily="34" charset="0"/>
+              <a:cs typeface="Arial" panose="020B0604020202020204" pitchFamily="34" charset="0"/>
+            </a:endParaRPr>
+          </a:p>
+        </p:txBody>
+      </p:sp>
     </p:spTree>
     <p:extLst>
       <p:ext uri="{BB962C8B-B14F-4D97-AF65-F5344CB8AC3E}">
@@ -5790,8 +6104,8 @@
         </p:blipFill>
         <p:spPr>
           <a:xfrm>
-            <a:off x="8788401" y="869412"/>
-            <a:ext cx="2988734" cy="5490701"/>
+            <a:off x="8623526" y="885309"/>
+            <a:ext cx="2743403" cy="5040000"/>
           </a:xfrm>
           <a:prstGeom prst="rect">
             <a:avLst/>
@@ -5826,14 +6140,37 @@
         </p:blipFill>
         <p:spPr>
           <a:xfrm>
-            <a:off x="414865" y="872891"/>
-            <a:ext cx="7907868" cy="5504156"/>
+            <a:off x="418095" y="869412"/>
+            <a:ext cx="7241010" cy="5040000"/>
           </a:xfrm>
           <a:prstGeom prst="rect">
             <a:avLst/>
           </a:prstGeom>
         </p:spPr>
       </p:pic>
+      <p:sp>
+        <p:nvSpPr>
+          <p:cNvPr id="8" name="Номер слайда 7"/>
+          <p:cNvSpPr>
+            <a:spLocks noGrp="1"/>
+          </p:cNvSpPr>
+          <p:nvPr>
+            <p:ph type="sldNum" sz="quarter" idx="12"/>
+          </p:nvPr>
+        </p:nvSpPr>
+        <p:spPr/>
+        <p:txBody>
+          <a:bodyPr/>
+          <a:lstStyle/>
+          <a:p>
+            <a:fld id="{877809C6-F2D1-4BB8-B240-DFC65F9EFAF3}" type="slidenum">
+              <a:rPr lang="ru-RU" smtClean="0"/>
+              <a:t>9</a:t>
+            </a:fld>
+            <a:endParaRPr lang="ru-RU"/>
+          </a:p>
+        </p:txBody>
+      </p:sp>
     </p:spTree>
     <p:extLst>
       <p:ext uri="{BB962C8B-B14F-4D97-AF65-F5344CB8AC3E}">

</xml_diff>